<commit_message>
results ppt & pdf
</commit_message>
<xml_diff>
--- a/EPL.pptx
+++ b/EPL.pptx
@@ -109,6 +109,11 @@
       </a:defRPr>
     </a:lvl9pPr>
   </p:defaultTextStyle>
+  <p:extLst>
+    <p:ext uri="{EFAFB233-063F-42B5-8137-9DF3F51BA10A}">
+      <p15:sldGuideLst xmlns:p15="http://schemas.microsoft.com/office/powerpoint/2012/main"/>
+    </p:ext>
+  </p:extLst>
 </p:presentation>
 </file>
 
@@ -14258,7 +14263,7 @@
           <a:prstGeom prst="straightConnector1">
             <a:avLst/>
           </a:prstGeom>
-          <a:ln w="28575">
+          <a:ln w="76200">
             <a:solidFill>
               <a:schemeClr val="tx1"/>
             </a:solidFill>

</xml_diff>